<commit_message>
updated the seq diagram
</commit_message>
<xml_diff>
--- a/CryptoPresentation.pptx
+++ b/CryptoPresentation.pptx
@@ -30223,8 +30223,8 @@
         </p:blipFill>
         <p:spPr>
           <a:xfrm>
-            <a:off x="5410975" y="0"/>
-            <a:ext cx="6781024" cy="6858000"/>
+            <a:off x="5410982" y="0"/>
+            <a:ext cx="6781013" cy="6858000"/>
           </a:xfrm>
           <a:prstGeom prst="rect">
             <a:avLst/>

</xml_diff>